<commit_message>
10:34 Oct 23 2016
</commit_message>
<xml_diff>
--- a/position paper/Cui_1-11_17-02 position.pptx
+++ b/position paper/Cui_1-11_17-02 position.pptx
@@ -1370,43 +1370,23 @@
             </a:r>
             <a:r>
               <a:rPr lang="en-US" baseline="0" dirty="0" smtClean="0"/>
-              <a:t> cadet cui and today I am going to </a:t>
-            </a:r>
-            <a:r>
-              <a:rPr lang="en-US" baseline="0" dirty="0" smtClean="0"/>
-              <a:t>brief you </a:t>
-            </a:r>
-            <a:r>
-              <a:rPr lang="en-US" baseline="0" dirty="0" smtClean="0"/>
-              <a:t>on the topic that </a:t>
+              <a:t> cadet cui and today I am going to brief you on the topic that </a:t>
             </a:r>
             <a:r>
               <a:rPr lang="en-US" sz="1200" dirty="0" smtClean="0">
                 <a:effectLst/>
               </a:rPr>
-              <a:t>The Air Force Should Not Recruit Only Officers </a:t>
+              <a:t>The Air Force Should Not Recruit Only Officers with </a:t>
+            </a:r>
+            <a:r>
+              <a:rPr lang="en-US" sz="1200" dirty="0" smtClean="0"/>
+              <a:t>Science, Technology, Engineering, and Mathematics  degrees, also know as</a:t>
             </a:r>
             <a:r>
               <a:rPr lang="en-US" sz="1200" dirty="0" smtClean="0">
                 <a:effectLst/>
               </a:rPr>
-              <a:t>with </a:t>
-            </a:r>
-            <a:r>
-              <a:rPr lang="en-US" sz="1200" dirty="0" smtClean="0"/>
-              <a:t>Science, Technology, Engineering, and Mathematics  degrees, also know as</a:t>
-            </a:r>
-            <a:r>
-              <a:rPr lang="en-US" sz="1200" dirty="0" smtClean="0">
-                <a:effectLst/>
-              </a:rPr>
-              <a:t> </a:t>
-            </a:r>
-            <a:r>
-              <a:rPr lang="en-US" sz="1200" dirty="0" smtClean="0">
-                <a:effectLst/>
-              </a:rPr>
-              <a:t>STEM Degrees</a:t>
+              <a:t> STEM Degrees</a:t>
             </a:r>
             <a:endParaRPr lang="en-US" dirty="0"/>
           </a:p>
@@ -1546,15 +1526,6 @@
               </a:rPr>
               <a:t> </a:t>
             </a:r>
-            <a:endParaRPr lang="en-US" sz="1200" kern="1200" dirty="0" smtClean="0">
-              <a:solidFill>
-                <a:schemeClr val="tx1"/>
-              </a:solidFill>
-              <a:effectLst/>
-              <a:latin typeface="+mn-lt"/>
-              <a:ea typeface="+mn-ea"/>
-              <a:cs typeface="+mn-cs"/>
-            </a:endParaRPr>
           </a:p>
           <a:p>
             <a:pPr marL="0" marR="0" lvl="0" indent="0" algn="l" defTabSz="914400" rtl="0" eaLnBrk="1" fontAlgn="auto" latinLnBrk="0" hangingPunct="1">
@@ -1603,6 +1574,34 @@
               <a:defRPr/>
             </a:pPr>
             <a:r>
+              <a:rPr lang="en-US" sz="1200" dirty="0" smtClean="0"/>
+              <a:t>Lt. Col. Gary T. McCoy, in his paper </a:t>
+            </a:r>
+            <a:r>
+              <a:rPr lang="en-US" sz="1200" i="1" dirty="0" smtClean="0"/>
+              <a:t>Developing </a:t>
+            </a:r>
+            <a:r>
+              <a:rPr lang="en-US" sz="1200" i="1" dirty="0" err="1" smtClean="0"/>
+              <a:t>Officership</a:t>
+            </a:r>
+            <a:r>
+              <a:rPr lang="en-US" sz="1200" i="1" dirty="0" smtClean="0"/>
+              <a:t>: It Starts At The Top</a:t>
+            </a:r>
+            <a:r>
+              <a:rPr lang="en-US" sz="1200" dirty="0" smtClean="0"/>
+              <a:t> stated</a:t>
+            </a:r>
+            <a:r>
+              <a:rPr lang="en-US" sz="1200" baseline="0" dirty="0" smtClean="0"/>
+              <a:t> that</a:t>
+            </a:r>
+            <a:r>
+              <a:rPr lang="en-US" sz="1200" dirty="0" smtClean="0"/>
+              <a:t> </a:t>
+            </a:r>
+            <a:r>
               <a:rPr lang="en-US" sz="1200" kern="1200" dirty="0" smtClean="0">
                 <a:solidFill>
                   <a:schemeClr val="tx1"/>
@@ -1661,205 +1660,6 @@
                 <a:cs typeface="+mn-cs"/>
               </a:rPr>
               <a:t> </a:t>
-            </a:r>
-          </a:p>
-          <a:p>
-            <a:pPr marL="0" marR="0" lvl="0" indent="0" algn="l" defTabSz="914400" rtl="0" eaLnBrk="1" fontAlgn="auto" latinLnBrk="0" hangingPunct="1">
-              <a:lnSpc>
-                <a:spcPct val="100000"/>
-              </a:lnSpc>
-              <a:spcBef>
-                <a:spcPts val="0"/>
-              </a:spcBef>
-              <a:spcAft>
-                <a:spcPts val="0"/>
-              </a:spcAft>
-              <a:buClrTx/>
-              <a:buSzTx/>
-              <a:buFontTx/>
-              <a:buNone/>
-              <a:tabLst/>
-              <a:defRPr/>
-            </a:pPr>
-            <a:endParaRPr lang="en-US" sz="1200" kern="1200" dirty="0" smtClean="0">
-              <a:solidFill>
-                <a:schemeClr val="tx1"/>
-              </a:solidFill>
-              <a:effectLst/>
-              <a:latin typeface="+mn-lt"/>
-              <a:ea typeface="+mn-ea"/>
-              <a:cs typeface="+mn-cs"/>
-            </a:endParaRPr>
-          </a:p>
-          <a:p>
-            <a:pPr marL="0" marR="0" lvl="0" indent="0" algn="l" defTabSz="914400" rtl="0" eaLnBrk="1" fontAlgn="auto" latinLnBrk="0" hangingPunct="1">
-              <a:lnSpc>
-                <a:spcPct val="100000"/>
-              </a:lnSpc>
-              <a:spcBef>
-                <a:spcPts val="0"/>
-              </a:spcBef>
-              <a:spcAft>
-                <a:spcPts val="0"/>
-              </a:spcAft>
-              <a:buClrTx/>
-              <a:buSzTx/>
-              <a:buFontTx/>
-              <a:buNone/>
-              <a:tabLst/>
-              <a:defRPr/>
-            </a:pPr>
-            <a:r>
-              <a:rPr lang="en-US" sz="1200" kern="1200" dirty="0" smtClean="0">
-                <a:solidFill>
-                  <a:schemeClr val="tx1"/>
-                </a:solidFill>
-                <a:effectLst/>
-                <a:latin typeface="+mn-lt"/>
-                <a:ea typeface="+mn-ea"/>
-                <a:cs typeface="+mn-cs"/>
-              </a:rPr>
-              <a:t>There are many soft skills such as integrity; charisma, inspiration, </a:t>
-            </a:r>
-            <a:r>
-              <a:rPr lang="en-US" sz="1200" kern="1200" dirty="0" smtClean="0">
-                <a:solidFill>
-                  <a:schemeClr val="tx1"/>
-                </a:solidFill>
-                <a:effectLst/>
-                <a:latin typeface="+mn-lt"/>
-                <a:ea typeface="+mn-ea"/>
-                <a:cs typeface="+mn-cs"/>
-              </a:rPr>
-              <a:t>vision, </a:t>
-            </a:r>
-            <a:r>
-              <a:rPr lang="en-US" sz="1200" kern="1200" dirty="0" smtClean="0">
-                <a:solidFill>
-                  <a:schemeClr val="tx1"/>
-                </a:solidFill>
-                <a:effectLst/>
-                <a:latin typeface="+mn-lt"/>
-                <a:ea typeface="+mn-ea"/>
-                <a:cs typeface="+mn-cs"/>
-              </a:rPr>
-              <a:t>effective team building, and communicating are all essential for becoming great leaders.</a:t>
-            </a:r>
-            <a:r>
-              <a:rPr lang="en-US" sz="1200" kern="1200" baseline="30000" dirty="0" smtClean="0">
-                <a:solidFill>
-                  <a:schemeClr val="tx1"/>
-                </a:solidFill>
-                <a:effectLst/>
-                <a:latin typeface="+mn-lt"/>
-                <a:ea typeface="+mn-ea"/>
-                <a:cs typeface="+mn-cs"/>
-              </a:rPr>
-              <a:t>10</a:t>
-            </a:r>
-            <a:r>
-              <a:rPr lang="en-US" sz="1200" kern="1200" dirty="0" smtClean="0">
-                <a:solidFill>
-                  <a:schemeClr val="tx1"/>
-                </a:solidFill>
-                <a:effectLst/>
-                <a:latin typeface="+mn-lt"/>
-                <a:ea typeface="+mn-ea"/>
-                <a:cs typeface="+mn-cs"/>
-              </a:rPr>
-              <a:t> None of the last four Chief of Staffs of the Air Force have a degree in STEM.</a:t>
-            </a:r>
-            <a:r>
-              <a:rPr lang="en-US" sz="1200" kern="1200" baseline="30000" dirty="0" smtClean="0">
-                <a:solidFill>
-                  <a:schemeClr val="tx1"/>
-                </a:solidFill>
-                <a:effectLst/>
-                <a:latin typeface="+mn-lt"/>
-                <a:ea typeface="+mn-ea"/>
-                <a:cs typeface="+mn-cs"/>
-              </a:rPr>
-              <a:t>11-14 </a:t>
-            </a:r>
-            <a:endParaRPr lang="en-US" sz="1200" kern="1200" baseline="30000" dirty="0" smtClean="0">
-              <a:solidFill>
-                <a:schemeClr val="tx1"/>
-              </a:solidFill>
-              <a:effectLst/>
-              <a:latin typeface="+mn-lt"/>
-              <a:ea typeface="+mn-ea"/>
-              <a:cs typeface="+mn-cs"/>
-            </a:endParaRPr>
-          </a:p>
-          <a:p>
-            <a:pPr marL="0" marR="0" lvl="0" indent="0" algn="l" defTabSz="914400" rtl="0" eaLnBrk="1" fontAlgn="auto" latinLnBrk="0" hangingPunct="1">
-              <a:lnSpc>
-                <a:spcPct val="100000"/>
-              </a:lnSpc>
-              <a:spcBef>
-                <a:spcPts val="0"/>
-              </a:spcBef>
-              <a:spcAft>
-                <a:spcPts val="0"/>
-              </a:spcAft>
-              <a:buClrTx/>
-              <a:buSzTx/>
-              <a:buFontTx/>
-              <a:buNone/>
-              <a:tabLst/>
-              <a:defRPr/>
-            </a:pPr>
-            <a:endParaRPr lang="en-US" sz="1200" kern="1200" baseline="30000" dirty="0" smtClean="0">
-              <a:solidFill>
-                <a:schemeClr val="tx1"/>
-              </a:solidFill>
-              <a:effectLst/>
-              <a:latin typeface="+mn-lt"/>
-              <a:ea typeface="+mn-ea"/>
-              <a:cs typeface="+mn-cs"/>
-            </a:endParaRPr>
-          </a:p>
-          <a:p>
-            <a:pPr marL="0" marR="0" lvl="0" indent="0" algn="l" defTabSz="914400" rtl="0" eaLnBrk="1" fontAlgn="auto" latinLnBrk="0" hangingPunct="1">
-              <a:lnSpc>
-                <a:spcPct val="100000"/>
-              </a:lnSpc>
-              <a:spcBef>
-                <a:spcPts val="0"/>
-              </a:spcBef>
-              <a:spcAft>
-                <a:spcPts val="0"/>
-              </a:spcAft>
-              <a:buClrTx/>
-              <a:buSzTx/>
-              <a:buFontTx/>
-              <a:buNone/>
-              <a:tabLst/>
-              <a:defRPr/>
-            </a:pPr>
-            <a:r>
-              <a:rPr lang="en-US" sz="1200" kern="1200" dirty="0" smtClean="0">
-                <a:solidFill>
-                  <a:schemeClr val="tx1"/>
-                </a:solidFill>
-                <a:effectLst/>
-                <a:latin typeface="+mn-lt"/>
-                <a:ea typeface="+mn-ea"/>
-                <a:cs typeface="+mn-cs"/>
-              </a:rPr>
-              <a:t>Should </a:t>
-            </a:r>
-            <a:r>
-              <a:rPr lang="en-US" sz="1200" kern="1200" dirty="0" smtClean="0">
-                <a:solidFill>
-                  <a:schemeClr val="tx1"/>
-                </a:solidFill>
-                <a:effectLst/>
-                <a:latin typeface="+mn-lt"/>
-                <a:ea typeface="+mn-ea"/>
-                <a:cs typeface="+mn-cs"/>
-              </a:rPr>
-              <a:t>the Air Force recruit only officers with STEM degrees, it will turn away many great future leaders. </a:t>
             </a:r>
           </a:p>
           <a:p>
@@ -1992,10 +1792,10 @@
                 <a:ea typeface="+mn-ea"/>
                 <a:cs typeface="+mn-cs"/>
               </a:rPr>
-              <a:t>The thing that separates military officers from all other professions is officership.</a:t>
-            </a:r>
-            <a:r>
-              <a:rPr lang="en-US" sz="1200" kern="1200" baseline="30000" dirty="0" smtClean="0">
+              <a:t>There </a:t>
+            </a:r>
+            <a:r>
+              <a:rPr lang="en-US" sz="1200" kern="1200" dirty="0" smtClean="0">
                 <a:solidFill>
                   <a:schemeClr val="tx1"/>
                 </a:solidFill>
@@ -2004,218 +1804,7 @@
                 <a:ea typeface="+mn-ea"/>
                 <a:cs typeface="+mn-cs"/>
               </a:rPr>
-              <a:t>8</a:t>
-            </a:r>
-            <a:r>
-              <a:rPr lang="en-US" sz="1200" kern="1200" dirty="0" smtClean="0">
-                <a:solidFill>
-                  <a:schemeClr val="tx1"/>
-                </a:solidFill>
-                <a:effectLst/>
-                <a:latin typeface="+mn-lt"/>
-                <a:ea typeface="+mn-ea"/>
-                <a:cs typeface="+mn-cs"/>
-              </a:rPr>
-              <a:t> </a:t>
-            </a:r>
-            <a:endParaRPr lang="en-US" sz="1200" kern="1200" dirty="0" smtClean="0">
-              <a:solidFill>
-                <a:schemeClr val="tx1"/>
-              </a:solidFill>
-              <a:effectLst/>
-              <a:latin typeface="+mn-lt"/>
-              <a:ea typeface="+mn-ea"/>
-              <a:cs typeface="+mn-cs"/>
-            </a:endParaRPr>
-          </a:p>
-          <a:p>
-            <a:pPr marL="0" marR="0" lvl="0" indent="0" algn="l" defTabSz="914400" rtl="0" eaLnBrk="1" fontAlgn="auto" latinLnBrk="0" hangingPunct="1">
-              <a:lnSpc>
-                <a:spcPct val="100000"/>
-              </a:lnSpc>
-              <a:spcBef>
-                <a:spcPts val="0"/>
-              </a:spcBef>
-              <a:spcAft>
-                <a:spcPts val="0"/>
-              </a:spcAft>
-              <a:buClrTx/>
-              <a:buSzTx/>
-              <a:buFontTx/>
-              <a:buNone/>
-              <a:tabLst/>
-              <a:defRPr/>
-            </a:pPr>
-            <a:endParaRPr lang="en-US" sz="1200" kern="1200" dirty="0" smtClean="0">
-              <a:solidFill>
-                <a:schemeClr val="tx1"/>
-              </a:solidFill>
-              <a:effectLst/>
-              <a:latin typeface="+mn-lt"/>
-              <a:ea typeface="+mn-ea"/>
-              <a:cs typeface="+mn-cs"/>
-            </a:endParaRPr>
-          </a:p>
-          <a:p>
-            <a:pPr marL="0" marR="0" lvl="0" indent="0" algn="l" defTabSz="914400" rtl="0" eaLnBrk="1" fontAlgn="auto" latinLnBrk="0" hangingPunct="1">
-              <a:lnSpc>
-                <a:spcPct val="100000"/>
-              </a:lnSpc>
-              <a:spcBef>
-                <a:spcPts val="0"/>
-              </a:spcBef>
-              <a:spcAft>
-                <a:spcPts val="0"/>
-              </a:spcAft>
-              <a:buClrTx/>
-              <a:buSzTx/>
-              <a:buFontTx/>
-              <a:buNone/>
-              <a:tabLst/>
-              <a:defRPr/>
-            </a:pPr>
-            <a:r>
-              <a:rPr lang="en-US" sz="1200" kern="1200" dirty="0" smtClean="0">
-                <a:solidFill>
-                  <a:schemeClr val="tx1"/>
-                </a:solidFill>
-                <a:effectLst/>
-                <a:latin typeface="+mn-lt"/>
-                <a:ea typeface="+mn-ea"/>
-                <a:cs typeface="+mn-cs"/>
-              </a:rPr>
-              <a:t>“</a:t>
-            </a:r>
-            <a:r>
-              <a:rPr lang="en-US" sz="1200" i="1" kern="1200" dirty="0" smtClean="0">
-                <a:solidFill>
-                  <a:schemeClr val="tx1"/>
-                </a:solidFill>
-                <a:effectLst/>
-                <a:latin typeface="+mn-lt"/>
-                <a:ea typeface="+mn-ea"/>
-                <a:cs typeface="+mn-cs"/>
-              </a:rPr>
-              <a:t>Officers must see themselves first as military leaders and secondly as specialists such as pilots, engineers, financial comptrollers, logisticians, air battle managers</a:t>
-            </a:r>
-            <a:r>
-              <a:rPr lang="en-US" sz="1200" kern="1200" dirty="0" smtClean="0">
-                <a:solidFill>
-                  <a:schemeClr val="tx1"/>
-                </a:solidFill>
-                <a:effectLst/>
-                <a:latin typeface="+mn-lt"/>
-                <a:ea typeface="+mn-ea"/>
-                <a:cs typeface="+mn-cs"/>
-              </a:rPr>
-              <a:t>.”</a:t>
-            </a:r>
-            <a:r>
-              <a:rPr lang="en-US" sz="1200" kern="1200" baseline="30000" dirty="0" smtClean="0">
-                <a:solidFill>
-                  <a:schemeClr val="tx1"/>
-                </a:solidFill>
-                <a:effectLst/>
-                <a:latin typeface="+mn-lt"/>
-                <a:ea typeface="+mn-ea"/>
-                <a:cs typeface="+mn-cs"/>
-              </a:rPr>
-              <a:t>9</a:t>
-            </a:r>
-            <a:r>
-              <a:rPr lang="en-US" sz="1200" kern="1200" dirty="0" smtClean="0">
-                <a:solidFill>
-                  <a:schemeClr val="tx1"/>
-                </a:solidFill>
-                <a:effectLst/>
-                <a:latin typeface="+mn-lt"/>
-                <a:ea typeface="+mn-ea"/>
-                <a:cs typeface="+mn-cs"/>
-              </a:rPr>
-              <a:t> </a:t>
-            </a:r>
-          </a:p>
-          <a:p>
-            <a:pPr marL="0" marR="0" lvl="0" indent="0" algn="l" defTabSz="914400" rtl="0" eaLnBrk="1" fontAlgn="auto" latinLnBrk="0" hangingPunct="1">
-              <a:lnSpc>
-                <a:spcPct val="100000"/>
-              </a:lnSpc>
-              <a:spcBef>
-                <a:spcPts val="0"/>
-              </a:spcBef>
-              <a:spcAft>
-                <a:spcPts val="0"/>
-              </a:spcAft>
-              <a:buClrTx/>
-              <a:buSzTx/>
-              <a:buFontTx/>
-              <a:buNone/>
-              <a:tabLst/>
-              <a:defRPr/>
-            </a:pPr>
-            <a:endParaRPr lang="en-US" sz="1200" kern="1200" dirty="0" smtClean="0">
-              <a:solidFill>
-                <a:schemeClr val="tx1"/>
-              </a:solidFill>
-              <a:effectLst/>
-              <a:latin typeface="+mn-lt"/>
-              <a:ea typeface="+mn-ea"/>
-              <a:cs typeface="+mn-cs"/>
-            </a:endParaRPr>
-          </a:p>
-          <a:p>
-            <a:pPr marL="0" marR="0" lvl="0" indent="0" algn="l" defTabSz="914400" rtl="0" eaLnBrk="1" fontAlgn="auto" latinLnBrk="0" hangingPunct="1">
-              <a:lnSpc>
-                <a:spcPct val="100000"/>
-              </a:lnSpc>
-              <a:spcBef>
-                <a:spcPts val="0"/>
-              </a:spcBef>
-              <a:spcAft>
-                <a:spcPts val="0"/>
-              </a:spcAft>
-              <a:buClrTx/>
-              <a:buSzTx/>
-              <a:buFontTx/>
-              <a:buNone/>
-              <a:tabLst/>
-              <a:defRPr/>
-            </a:pPr>
-            <a:r>
-              <a:rPr lang="en-US" sz="1200" kern="1200" dirty="0" smtClean="0">
-                <a:solidFill>
-                  <a:schemeClr val="tx1"/>
-                </a:solidFill>
-                <a:effectLst/>
-                <a:latin typeface="+mn-lt"/>
-                <a:ea typeface="+mn-ea"/>
-                <a:cs typeface="+mn-cs"/>
-              </a:rPr>
-              <a:t>There are many soft skills such as integrity; charisma, inspiration, </a:t>
-            </a:r>
-            <a:r>
-              <a:rPr lang="en-US" sz="1200" kern="1200" dirty="0" smtClean="0">
-                <a:solidFill>
-                  <a:schemeClr val="tx1"/>
-                </a:solidFill>
-                <a:effectLst/>
-                <a:latin typeface="+mn-lt"/>
-                <a:ea typeface="+mn-ea"/>
-                <a:cs typeface="+mn-cs"/>
-              </a:rPr>
-              <a:t>vision, </a:t>
-            </a:r>
-            <a:r>
-              <a:rPr lang="en-US" sz="1200" kern="1200" dirty="0" smtClean="0">
-                <a:solidFill>
-                  <a:schemeClr val="tx1"/>
-                </a:solidFill>
-                <a:effectLst/>
-                <a:latin typeface="+mn-lt"/>
-                <a:ea typeface="+mn-ea"/>
-                <a:cs typeface="+mn-cs"/>
-              </a:rPr>
-              <a:t>effective team building, and communicating are all essential for becoming great leaders.</a:t>
+              <a:t>are many soft skills such as integrity; charisma, inspiration, vision, effective team building, and communicating are all essential for becoming great leaders.</a:t>
             </a:r>
             <a:r>
               <a:rPr lang="en-US" sz="1200" kern="1200" baseline="30000" dirty="0" smtClean="0">
@@ -2253,15 +1842,6 @@
               </a:rPr>
               <a:t>11-14 </a:t>
             </a:r>
-            <a:endParaRPr lang="en-US" sz="1200" kern="1200" baseline="30000" dirty="0" smtClean="0">
-              <a:solidFill>
-                <a:schemeClr val="tx1"/>
-              </a:solidFill>
-              <a:effectLst/>
-              <a:latin typeface="+mn-lt"/>
-              <a:ea typeface="+mn-ea"/>
-              <a:cs typeface="+mn-cs"/>
-            </a:endParaRPr>
           </a:p>
           <a:p>
             <a:pPr marL="0" marR="0" lvl="0" indent="0" algn="l" defTabSz="914400" rtl="0" eaLnBrk="1" fontAlgn="auto" latinLnBrk="0" hangingPunct="1">
@@ -2319,19 +1899,7 @@
                 <a:ea typeface="+mn-ea"/>
                 <a:cs typeface="+mn-cs"/>
               </a:rPr>
-              <a:t>Should </a:t>
-            </a:r>
-            <a:r>
-              <a:rPr lang="en-US" sz="1200" kern="1200" dirty="0" smtClean="0">
-                <a:solidFill>
-                  <a:schemeClr val="tx1"/>
-                </a:solidFill>
-                <a:effectLst/>
-                <a:latin typeface="+mn-lt"/>
-                <a:ea typeface="+mn-ea"/>
-                <a:cs typeface="+mn-cs"/>
-              </a:rPr>
-              <a:t>the Air Force recruit only officers with STEM degrees, it will turn away many great future leaders. </a:t>
+              <a:t>Should the Air Force recruit only officers with STEM degrees, it will turn away many great future leaders. </a:t>
             </a:r>
           </a:p>
           <a:p>
@@ -2437,6 +2005,137 @@
           <a:bodyPr/>
           <a:lstStyle/>
           <a:p>
+            <a:pPr marL="0" marR="0" lvl="0" indent="0" algn="l" defTabSz="914400" rtl="0" eaLnBrk="1" fontAlgn="auto" latinLnBrk="0" hangingPunct="1">
+              <a:lnSpc>
+                <a:spcPct val="100000"/>
+              </a:lnSpc>
+              <a:spcBef>
+                <a:spcPts val="0"/>
+              </a:spcBef>
+              <a:spcAft>
+                <a:spcPts val="0"/>
+              </a:spcAft>
+              <a:buClrTx/>
+              <a:buSzTx/>
+              <a:buFontTx/>
+              <a:buNone/>
+              <a:tabLst/>
+              <a:defRPr/>
+            </a:pPr>
+            <a:r>
+              <a:rPr lang="en-US" sz="1200" kern="1200" baseline="0" dirty="0" smtClean="0">
+                <a:solidFill>
+                  <a:schemeClr val="tx1"/>
+                </a:solidFill>
+                <a:effectLst/>
+                <a:latin typeface="+mn-lt"/>
+                <a:ea typeface="+mn-ea"/>
+                <a:cs typeface="+mn-cs"/>
+              </a:rPr>
+              <a:t>In this briefing, I’ve talked about why the air force should not only recruit officers with STEM degrees. Officers with STEM degrees are not eligible for some career fields which require a license or a background in i</a:t>
+            </a:r>
+            <a:r>
+              <a:rPr lang="en-US" sz="1200" b="0" i="0" kern="1200" dirty="0" smtClean="0">
+                <a:solidFill>
+                  <a:schemeClr val="tx1"/>
+                </a:solidFill>
+                <a:effectLst/>
+                <a:latin typeface="+mn-lt"/>
+                <a:ea typeface="+mn-ea"/>
+                <a:cs typeface="+mn-cs"/>
+              </a:rPr>
+              <a:t>n the medical</a:t>
+            </a:r>
+            <a:r>
+              <a:rPr lang="en-US" sz="1200" b="0" i="0" kern="1200" baseline="0" dirty="0" smtClean="0">
+                <a:solidFill>
+                  <a:schemeClr val="tx1"/>
+                </a:solidFill>
+                <a:effectLst/>
+                <a:latin typeface="+mn-lt"/>
+                <a:ea typeface="+mn-ea"/>
+                <a:cs typeface="+mn-cs"/>
+              </a:rPr>
+              <a:t> , </a:t>
+            </a:r>
+            <a:r>
+              <a:rPr lang="en-US" sz="1200" b="0" i="0" kern="1200" dirty="0" smtClean="0">
+                <a:solidFill>
+                  <a:schemeClr val="tx1"/>
+                </a:solidFill>
+                <a:effectLst/>
+                <a:latin typeface="+mn-lt"/>
+                <a:ea typeface="+mn-ea"/>
+                <a:cs typeface="+mn-cs"/>
+              </a:rPr>
+              <a:t>legal or chaplaincy fields</a:t>
+            </a:r>
+            <a:endParaRPr lang="en-US" sz="1200" kern="1200" baseline="0" dirty="0" smtClean="0">
+              <a:solidFill>
+                <a:schemeClr val="tx1"/>
+              </a:solidFill>
+              <a:effectLst/>
+              <a:latin typeface="+mn-lt"/>
+              <a:ea typeface="+mn-ea"/>
+              <a:cs typeface="+mn-cs"/>
+            </a:endParaRPr>
+          </a:p>
+          <a:p>
+            <a:endParaRPr lang="en-US" sz="1200" kern="1200" baseline="0" dirty="0" smtClean="0">
+              <a:solidFill>
+                <a:schemeClr val="tx1"/>
+              </a:solidFill>
+              <a:effectLst/>
+              <a:latin typeface="+mn-lt"/>
+              <a:ea typeface="+mn-ea"/>
+              <a:cs typeface="+mn-cs"/>
+            </a:endParaRPr>
+          </a:p>
+          <a:p>
+            <a:pPr marL="0" marR="0" lvl="0" indent="0" algn="l" defTabSz="914400" rtl="0" eaLnBrk="1" fontAlgn="auto" latinLnBrk="0" hangingPunct="1">
+              <a:lnSpc>
+                <a:spcPct val="100000"/>
+              </a:lnSpc>
+              <a:spcBef>
+                <a:spcPts val="0"/>
+              </a:spcBef>
+              <a:spcAft>
+                <a:spcPts val="0"/>
+              </a:spcAft>
+              <a:buClrTx/>
+              <a:buSzTx/>
+              <a:buFontTx/>
+              <a:buNone/>
+              <a:tabLst/>
+              <a:defRPr/>
+            </a:pPr>
+            <a:r>
+              <a:rPr lang="en-US" sz="1200" kern="1200" baseline="0" dirty="0" smtClean="0">
+                <a:solidFill>
+                  <a:schemeClr val="tx1"/>
+                </a:solidFill>
+                <a:effectLst/>
+                <a:latin typeface="+mn-lt"/>
+                <a:ea typeface="+mn-ea"/>
+                <a:cs typeface="+mn-cs"/>
+              </a:rPr>
+              <a:t>One may argue that due to growing needs of the Air Force, STEM degrees are highly needed, but I laid the fact that the soft skills are important for officers.  </a:t>
+            </a:r>
+            <a:r>
+              <a:rPr lang="en-US" sz="1200" kern="1200" dirty="0" smtClean="0">
+                <a:solidFill>
+                  <a:schemeClr val="tx1"/>
+                </a:solidFill>
+                <a:effectLst/>
+                <a:latin typeface="+mn-lt"/>
+                <a:ea typeface="+mn-ea"/>
+                <a:cs typeface="+mn-cs"/>
+              </a:rPr>
+              <a:t>recruiting only officers with STEM degrees will turn away many great officers with non-STEM degrees.</a:t>
+            </a:r>
+            <a:endParaRPr lang="en-US" dirty="0" smtClean="0"/>
+          </a:p>
+          <a:p>
             <a:endParaRPr lang="en-US" dirty="0"/>
           </a:p>
         </p:txBody>
@@ -2876,55 +2575,7 @@
                 <a:ea typeface="+mn-ea"/>
                 <a:cs typeface="+mn-cs"/>
               </a:rPr>
-              <a:t>will </a:t>
-            </a:r>
-            <a:r>
-              <a:rPr lang="en-US" sz="1200" kern="1200" baseline="0" dirty="0" smtClean="0">
-                <a:solidFill>
-                  <a:schemeClr val="tx1"/>
-                </a:solidFill>
-                <a:effectLst/>
-                <a:latin typeface="+mn-lt"/>
-                <a:ea typeface="+mn-ea"/>
-                <a:cs typeface="+mn-cs"/>
-              </a:rPr>
-              <a:t>talk </a:t>
-            </a:r>
-            <a:r>
-              <a:rPr lang="en-US" sz="1200" kern="1200" baseline="0" dirty="0" smtClean="0">
-                <a:solidFill>
-                  <a:schemeClr val="tx1"/>
-                </a:solidFill>
-                <a:effectLst/>
-                <a:latin typeface="+mn-lt"/>
-                <a:ea typeface="+mn-ea"/>
-                <a:cs typeface="+mn-cs"/>
-              </a:rPr>
-              <a:t>about why </a:t>
-            </a:r>
-            <a:r>
-              <a:rPr lang="en-US" sz="1200" kern="1200" baseline="0" dirty="0" smtClean="0">
-                <a:solidFill>
-                  <a:schemeClr val="tx1"/>
-                </a:solidFill>
-                <a:effectLst/>
-                <a:latin typeface="+mn-lt"/>
-                <a:ea typeface="+mn-ea"/>
-                <a:cs typeface="+mn-cs"/>
-              </a:rPr>
-              <a:t>the air force should not only recruit officers with STEM </a:t>
-            </a:r>
-            <a:r>
-              <a:rPr lang="en-US" sz="1200" kern="1200" baseline="0" dirty="0" smtClean="0">
-                <a:solidFill>
-                  <a:schemeClr val="tx1"/>
-                </a:solidFill>
-                <a:effectLst/>
-                <a:latin typeface="+mn-lt"/>
-                <a:ea typeface="+mn-ea"/>
-                <a:cs typeface="+mn-cs"/>
-              </a:rPr>
-              <a:t>degrees. Officers with STEM degrees are not qualified for some career fields which require a license or a background in i</a:t>
+              <a:t>will talk about why the air force should not only recruit officers with STEM degrees. Officers with STEM degrees are not qualified for some career fields which require a license or a background in i</a:t>
             </a:r>
             <a:r>
               <a:rPr lang="en-US" sz="1200" b="0" i="0" kern="1200" dirty="0" smtClean="0">
@@ -3011,55 +2662,7 @@
                 <a:ea typeface="+mn-ea"/>
                 <a:cs typeface="+mn-cs"/>
               </a:rPr>
-              <a:t>One </a:t>
-            </a:r>
-            <a:r>
-              <a:rPr lang="en-US" sz="1200" kern="1200" baseline="0" dirty="0" smtClean="0">
-                <a:solidFill>
-                  <a:schemeClr val="tx1"/>
-                </a:solidFill>
-                <a:effectLst/>
-                <a:latin typeface="+mn-lt"/>
-                <a:ea typeface="+mn-ea"/>
-                <a:cs typeface="+mn-cs"/>
-              </a:rPr>
-              <a:t>may argue that </a:t>
-            </a:r>
-            <a:r>
-              <a:rPr lang="en-US" sz="1200" kern="1200" baseline="0" dirty="0" smtClean="0">
-                <a:solidFill>
-                  <a:schemeClr val="tx1"/>
-                </a:solidFill>
-                <a:effectLst/>
-                <a:latin typeface="+mn-lt"/>
-                <a:ea typeface="+mn-ea"/>
-                <a:cs typeface="+mn-cs"/>
-              </a:rPr>
-              <a:t>due to growing needs of the Air Force, STEM </a:t>
-            </a:r>
-            <a:r>
-              <a:rPr lang="en-US" sz="1200" kern="1200" baseline="0" dirty="0" smtClean="0">
-                <a:solidFill>
-                  <a:schemeClr val="tx1"/>
-                </a:solidFill>
-                <a:effectLst/>
-                <a:latin typeface="+mn-lt"/>
-                <a:ea typeface="+mn-ea"/>
-                <a:cs typeface="+mn-cs"/>
-              </a:rPr>
-              <a:t>degrees are highly </a:t>
-            </a:r>
-            <a:r>
-              <a:rPr lang="en-US" sz="1200" kern="1200" baseline="0" dirty="0" smtClean="0">
-                <a:solidFill>
-                  <a:schemeClr val="tx1"/>
-                </a:solidFill>
-                <a:effectLst/>
-                <a:latin typeface="+mn-lt"/>
-                <a:ea typeface="+mn-ea"/>
-                <a:cs typeface="+mn-cs"/>
-              </a:rPr>
-              <a:t>sought, but I will lay out the fact that the soft skills are important for officers, </a:t>
+              <a:t>One may argue that due to growing needs of the Air Force, STEM degrees are highly sought, but I will lay out the fact that the soft skills are important for officers, </a:t>
             </a:r>
             <a:r>
               <a:rPr lang="en-US" sz="1200" kern="1200" dirty="0" smtClean="0">
@@ -3099,15 +2702,6 @@
               </a:rPr>
               <a:t>// additional comments</a:t>
             </a:r>
-            <a:endParaRPr lang="en-US" sz="1200" kern="1200" baseline="0" dirty="0" smtClean="0">
-              <a:solidFill>
-                <a:schemeClr val="tx1"/>
-              </a:solidFill>
-              <a:effectLst/>
-              <a:latin typeface="+mn-lt"/>
-              <a:ea typeface="+mn-ea"/>
-              <a:cs typeface="+mn-cs"/>
-            </a:endParaRPr>
           </a:p>
           <a:p>
             <a:r>
@@ -3252,19 +2846,7 @@
                 <a:ea typeface="+mn-ea"/>
                 <a:cs typeface="+mn-cs"/>
               </a:rPr>
-              <a:t>The </a:t>
-            </a:r>
-            <a:r>
-              <a:rPr lang="en-US" sz="1200" kern="1200" dirty="0" smtClean="0">
-                <a:solidFill>
-                  <a:schemeClr val="tx1"/>
-                </a:solidFill>
-                <a:effectLst/>
-                <a:latin typeface="+mn-lt"/>
-                <a:ea typeface="+mn-ea"/>
-                <a:cs typeface="+mn-cs"/>
-              </a:rPr>
-              <a:t>Air Force should not recruit only officers with science, technology, engineering, and math (STEM) degrees. Officers with STEM degrees are not qualified for the career fields that require special skills and professional degrees such as Doctor of Medicine (MD) and Doctor of Law Degree (JD). Although STEM degrees are valued in some non-STEM required career fields, recruiting only officers with STEM degrees will turn away many great officers with non-STEM degrees.</a:t>
+              <a:t>The Air Force should not recruit only officers with science, technology, engineering, and math (STEM) degrees. Officers with STEM degrees are not qualified for the career fields that require special skills and professional degrees such as Doctor of Medicine (MD) and Doctor of Law Degree (JD). Although STEM degrees are valued in some non-STEM required career fields, recruiting only officers with STEM degrees will turn away many great officers with non-STEM degrees.</a:t>
             </a:r>
             <a:endParaRPr lang="en-US" dirty="0"/>
           </a:p>
@@ -3370,7 +2952,7 @@
             </a:pPr>
             <a:r>
               <a:rPr lang="en-US" dirty="0" smtClean="0"/>
-              <a:t>STEM </a:t>
+              <a:t>//STEM </a:t>
             </a:r>
             <a:r>
               <a:rPr lang="en-US" dirty="0" smtClean="0"/>
@@ -3378,11 +2960,7 @@
             </a:r>
             <a:r>
               <a:rPr lang="en-US" baseline="0" dirty="0" smtClean="0"/>
-              <a:t> acronym for Science, Technology, Engineering, and </a:t>
-            </a:r>
-            <a:r>
-              <a:rPr lang="en-US" baseline="0" dirty="0" smtClean="0"/>
-              <a:t>Mathematics.</a:t>
+              <a:t> acronym for Science, Technology, Engineering, and Mathematics.</a:t>
             </a:r>
           </a:p>
           <a:p>
@@ -3480,11 +3058,7 @@
           <a:p>
             <a:r>
               <a:rPr lang="en-US" baseline="0" dirty="0" smtClean="0"/>
-              <a:t>According </a:t>
-            </a:r>
-            <a:r>
-              <a:rPr lang="en-US" baseline="0" dirty="0" smtClean="0"/>
-              <a:t>to </a:t>
+              <a:t>According to </a:t>
             </a:r>
             <a:r>
               <a:rPr lang="en-US" sz="1200" kern="1200" dirty="0" smtClean="0">
@@ -3508,10 +3082,10 @@
                 <a:ea typeface="+mn-ea"/>
                 <a:cs typeface="+mn-cs"/>
               </a:rPr>
-              <a:t>Examination of the U.S. Air Force’s Science, Technology, Engineering, and Mathematics (STEM) Workforce Needs in the Future and Its Strategy to Meet Those Need. </a:t>
-            </a:r>
-            <a:r>
-              <a:rPr lang="en-US" sz="1200" kern="1200" dirty="0" smtClean="0">
+              <a:t>Examination of the U.S. Air Force’s </a:t>
+            </a:r>
+            <a:r>
+              <a:rPr lang="en-US" sz="1200" i="1" kern="1200" dirty="0" smtClean="0">
                 <a:solidFill>
                   <a:schemeClr val="tx1"/>
                 </a:solidFill>
@@ -3520,10 +3094,10 @@
                 <a:ea typeface="+mn-ea"/>
                 <a:cs typeface="+mn-cs"/>
               </a:rPr>
-              <a:t>There are 26 officer career fields that are identified by Air Force Specialty Codes (AFSCs). </a:t>
-            </a:r>
-            <a:r>
-              <a:rPr lang="en-US" sz="1200" kern="1200" dirty="0" smtClean="0">
+              <a:t>STEM</a:t>
+            </a:r>
+            <a:r>
+              <a:rPr lang="en-US" sz="1200" i="1" kern="1200" dirty="0" smtClean="0">
                 <a:solidFill>
                   <a:schemeClr val="tx1"/>
                 </a:solidFill>
@@ -3532,7 +3106,7 @@
                 <a:ea typeface="+mn-ea"/>
                 <a:cs typeface="+mn-cs"/>
               </a:rPr>
-              <a:t>However, only </a:t>
+              <a:t>) Workforce Needs in the Future and Its Strategy to Meet Those Need. </a:t>
             </a:r>
             <a:r>
               <a:rPr lang="en-US" sz="1200" kern="1200" dirty="0" smtClean="0">
@@ -3544,19 +3118,7 @@
                 <a:ea typeface="+mn-ea"/>
                 <a:cs typeface="+mn-cs"/>
               </a:rPr>
-              <a:t>five career fields require a STEM degree</a:t>
-            </a:r>
-            <a:r>
-              <a:rPr lang="en-US" sz="1200" kern="1200" dirty="0" smtClean="0">
-                <a:solidFill>
-                  <a:schemeClr val="tx1"/>
-                </a:solidFill>
-                <a:effectLst/>
-                <a:latin typeface="+mn-lt"/>
-                <a:ea typeface="+mn-ea"/>
-                <a:cs typeface="+mn-cs"/>
-              </a:rPr>
-              <a:t>.  </a:t>
+              <a:t>There are 26 officer career fields that are identified by Air Force Specialty Codes (AFSCs). However, only five career fields require a STEM degree.  </a:t>
             </a:r>
             <a:endParaRPr lang="en-US" dirty="0" smtClean="0"/>
           </a:p>
@@ -3682,31 +3244,7 @@
                 <a:ea typeface="+mn-ea"/>
                 <a:cs typeface="+mn-cs"/>
               </a:rPr>
-              <a:t> </a:t>
-            </a:r>
-            <a:r>
-              <a:rPr lang="en-US" sz="1200" kern="1200" baseline="0" dirty="0" smtClean="0">
-                <a:solidFill>
-                  <a:schemeClr val="tx1"/>
-                </a:solidFill>
-                <a:effectLst/>
-                <a:latin typeface="+mn-lt"/>
-                <a:ea typeface="+mn-ea"/>
-                <a:cs typeface="+mn-cs"/>
-              </a:rPr>
-              <a:t>fields require </a:t>
-            </a:r>
-            <a:r>
-              <a:rPr lang="en-US" sz="1200" kern="1200" baseline="0" dirty="0" smtClean="0">
-                <a:solidFill>
-                  <a:schemeClr val="tx1"/>
-                </a:solidFill>
-                <a:effectLst/>
-                <a:latin typeface="+mn-lt"/>
-                <a:ea typeface="+mn-ea"/>
-                <a:cs typeface="+mn-cs"/>
-              </a:rPr>
-              <a:t>a </a:t>
+              <a:t> fields require a </a:t>
             </a:r>
             <a:r>
               <a:rPr lang="en-US" sz="1200" b="0" i="0" kern="1200" baseline="0" dirty="0" smtClean="0">
@@ -3805,7 +3343,11 @@
             </a:pPr>
             <a:r>
               <a:rPr lang="en-US" sz="1200" dirty="0" smtClean="0"/>
-              <a:t>And some career fields require professional degrees.</a:t>
+              <a:t>And some career fields require </a:t>
+            </a:r>
+            <a:r>
+              <a:rPr lang="en-US" sz="1200" dirty="0" smtClean="0"/>
+              <a:t>a professional degree.</a:t>
             </a:r>
             <a:r>
               <a:rPr lang="en-US" sz="1200" baseline="30000" dirty="0" smtClean="0"/>
@@ -3825,23 +3367,7 @@
             </a:r>
             <a:r>
               <a:rPr lang="en-US" sz="1200" dirty="0" smtClean="0"/>
-              <a:t>Doctor </a:t>
-            </a:r>
-            <a:r>
-              <a:rPr lang="en-US" sz="1200" dirty="0" smtClean="0"/>
-              <a:t>of Medicine (MD) and Doctor of Law Degree (JD) </a:t>
-            </a:r>
-            <a:r>
-              <a:rPr lang="en-US" sz="1200" dirty="0" smtClean="0"/>
-              <a:t>and require </a:t>
-            </a:r>
-            <a:r>
-              <a:rPr lang="en-US" sz="1200" dirty="0" smtClean="0"/>
-              <a:t>multi year of </a:t>
-            </a:r>
-            <a:r>
-              <a:rPr lang="en-US" sz="1200" dirty="0" smtClean="0"/>
-              <a:t>training.</a:t>
+              <a:t>Doctor of Medicine (MD) and Doctor of Law Degree (JD) and require multi year of training.</a:t>
             </a:r>
             <a:r>
               <a:rPr lang="en-US" sz="1200" baseline="30000" dirty="0" smtClean="0"/>
@@ -3896,7 +3422,31 @@
                 <a:ea typeface="+mn-ea"/>
                 <a:cs typeface="+mn-cs"/>
               </a:rPr>
-              <a:t>Officers with STEM degrees are not qualified for these fields. </a:t>
+              <a:t>Officers with STEM degrees </a:t>
+            </a:r>
+            <a:r>
+              <a:rPr lang="en-US" sz="1200" kern="1200" baseline="0" dirty="0" smtClean="0">
+                <a:solidFill>
+                  <a:schemeClr val="tx1"/>
+                </a:solidFill>
+                <a:effectLst/>
+                <a:latin typeface="+mn-lt"/>
+                <a:ea typeface="+mn-ea"/>
+                <a:cs typeface="+mn-cs"/>
+              </a:rPr>
+              <a:t>generally are </a:t>
+            </a:r>
+            <a:r>
+              <a:rPr lang="en-US" sz="1200" kern="1200" baseline="0" dirty="0" smtClean="0">
+                <a:solidFill>
+                  <a:schemeClr val="tx1"/>
+                </a:solidFill>
+                <a:effectLst/>
+                <a:latin typeface="+mn-lt"/>
+                <a:ea typeface="+mn-ea"/>
+                <a:cs typeface="+mn-cs"/>
+              </a:rPr>
+              <a:t>not qualified for these fields. </a:t>
             </a:r>
           </a:p>
           <a:p>
@@ -3987,7 +3537,31 @@
                 <a:ea typeface="+mn-ea"/>
                 <a:cs typeface="+mn-cs"/>
               </a:rPr>
-              <a:t> the Air Force must recruit officer with various background to fit </a:t>
+              <a:t> the Air Force must recruit </a:t>
+            </a:r>
+            <a:r>
+              <a:rPr lang="en-US" sz="1200" b="0" i="0" kern="1200" baseline="0" dirty="0" smtClean="0">
+                <a:solidFill>
+                  <a:schemeClr val="tx1"/>
+                </a:solidFill>
+                <a:effectLst/>
+                <a:latin typeface="+mn-lt"/>
+                <a:ea typeface="+mn-ea"/>
+                <a:cs typeface="+mn-cs"/>
+              </a:rPr>
+              <a:t>officers </a:t>
+            </a:r>
+            <a:r>
+              <a:rPr lang="en-US" sz="1200" b="0" i="0" kern="1200" baseline="0" dirty="0" smtClean="0">
+                <a:solidFill>
+                  <a:schemeClr val="tx1"/>
+                </a:solidFill>
+                <a:effectLst/>
+                <a:latin typeface="+mn-lt"/>
+                <a:ea typeface="+mn-ea"/>
+                <a:cs typeface="+mn-cs"/>
+              </a:rPr>
+              <a:t>with various background to fit </a:t>
             </a:r>
             <a:r>
               <a:rPr lang="en-US" sz="1200" kern="1200" dirty="0" smtClean="0">
@@ -4069,15 +3643,6 @@
               </a:rPr>
               <a:t>// additional comments</a:t>
             </a:r>
-            <a:endParaRPr lang="en-US" sz="1200" b="0" i="0" kern="1200" dirty="0" smtClean="0">
-              <a:solidFill>
-                <a:schemeClr val="tx1"/>
-              </a:solidFill>
-              <a:effectLst/>
-              <a:latin typeface="+mn-lt"/>
-              <a:ea typeface="+mn-ea"/>
-              <a:cs typeface="+mn-cs"/>
-            </a:endParaRPr>
           </a:p>
           <a:p>
             <a:pPr marL="0" marR="0" lvl="0" indent="0" algn="l" defTabSz="914400" rtl="0" eaLnBrk="1" fontAlgn="auto" latinLnBrk="0" hangingPunct="1">
@@ -4306,7 +3871,7 @@
                 <a:ea typeface="+mn-ea"/>
                 <a:cs typeface="+mn-cs"/>
               </a:rPr>
-              <a:t>One may argue that</a:t>
+              <a:t>One may argue that, </a:t>
             </a:r>
             <a:r>
               <a:rPr lang="en-US" sz="1200" kern="1200" baseline="0" dirty="0" smtClean="0">
@@ -4318,10 +3883,10 @@
                 <a:ea typeface="+mn-ea"/>
                 <a:cs typeface="+mn-cs"/>
               </a:rPr>
-              <a:t> there are no stated requirements for degrees in some career fields, </a:t>
-            </a:r>
-            <a:r>
-              <a:rPr lang="en-US" sz="1200" kern="1200" dirty="0" smtClean="0">
+              <a:t> in </a:t>
+            </a:r>
+            <a:r>
+              <a:rPr lang="en-US" sz="1200" kern="1200" baseline="0" dirty="0" smtClean="0">
                 <a:solidFill>
                   <a:schemeClr val="tx1"/>
                 </a:solidFill>
@@ -4330,7 +3895,7 @@
                 <a:ea typeface="+mn-ea"/>
                 <a:cs typeface="+mn-cs"/>
               </a:rPr>
-              <a:t>such </a:t>
+              <a:t>some career fields, </a:t>
             </a:r>
             <a:r>
               <a:rPr lang="en-US" sz="1200" kern="1200" dirty="0" smtClean="0">
@@ -4342,10 +3907,10 @@
                 <a:ea typeface="+mn-ea"/>
                 <a:cs typeface="+mn-cs"/>
               </a:rPr>
-              <a:t>as intelligence, cyberspace, personnel, acquisition management, logistics, space and missiles, have no stated requirements for degrees.</a:t>
-            </a:r>
-            <a:r>
-              <a:rPr lang="en-US" sz="1200" kern="1200" baseline="30000" dirty="0" smtClean="0">
+              <a:t>such as intelligence, cyberspace, personnel, acquisition management, logistics, space and missiles, </a:t>
+            </a:r>
+            <a:r>
+              <a:rPr lang="en-US" sz="1200" kern="1200" baseline="0" dirty="0" smtClean="0">
                 <a:solidFill>
                   <a:schemeClr val="tx1"/>
                 </a:solidFill>
@@ -4354,19 +3919,7 @@
                 <a:ea typeface="+mn-ea"/>
                 <a:cs typeface="+mn-cs"/>
               </a:rPr>
-              <a:t>3</a:t>
-            </a:r>
-            <a:r>
-              <a:rPr lang="en-US" sz="1200" kern="1200" dirty="0" smtClean="0">
-                <a:solidFill>
-                  <a:schemeClr val="tx1"/>
-                </a:solidFill>
-                <a:effectLst/>
-                <a:latin typeface="+mn-lt"/>
-                <a:ea typeface="+mn-ea"/>
-                <a:cs typeface="+mn-cs"/>
-              </a:rPr>
-              <a:t> </a:t>
+              <a:t>there are no stated requirements.</a:t>
             </a:r>
             <a:endParaRPr lang="en-US" sz="1200" kern="1200" dirty="0" smtClean="0">
               <a:solidFill>
@@ -4434,31 +3987,7 @@
                 <a:ea typeface="+mn-ea"/>
                 <a:cs typeface="+mn-cs"/>
               </a:rPr>
-              <a:t>The </a:t>
-            </a:r>
-            <a:r>
-              <a:rPr lang="en-US" sz="1200" kern="1200" dirty="0" smtClean="0">
-                <a:solidFill>
-                  <a:schemeClr val="tx1"/>
-                </a:solidFill>
-                <a:effectLst/>
-                <a:latin typeface="+mn-lt"/>
-                <a:ea typeface="+mn-ea"/>
-                <a:cs typeface="+mn-cs"/>
-              </a:rPr>
-              <a:t>officers with STEM degrees are valued in these career fields. </a:t>
-            </a:r>
-            <a:r>
-              <a:rPr lang="en-US" sz="1200" kern="1200" dirty="0" smtClean="0">
-                <a:solidFill>
-                  <a:schemeClr val="tx1"/>
-                </a:solidFill>
-                <a:effectLst/>
-                <a:latin typeface="+mn-lt"/>
-                <a:ea typeface="+mn-ea"/>
-                <a:cs typeface="+mn-cs"/>
-              </a:rPr>
-              <a:t> </a:t>
+              <a:t>The officers with STEM degrees are valued in these career fields.  </a:t>
             </a:r>
           </a:p>
           <a:p>
@@ -4553,7 +4082,31 @@
                 <a:ea typeface="+mn-ea"/>
                 <a:cs typeface="+mn-cs"/>
               </a:rPr>
-              <a:t>Air Force–Wide Needs for Science, Technology, Engineering, and Mathematics (STEM) Academic Degrees</a:t>
+              <a:t>Air Force–Wide Needs for </a:t>
+            </a:r>
+            <a:r>
+              <a:rPr lang="en-US" sz="1200" i="1" kern="1200" dirty="0" smtClean="0">
+                <a:solidFill>
+                  <a:schemeClr val="tx1"/>
+                </a:solidFill>
+                <a:effectLst/>
+                <a:latin typeface="+mn-lt"/>
+                <a:ea typeface="+mn-ea"/>
+                <a:cs typeface="+mn-cs"/>
+              </a:rPr>
+              <a:t>(</a:t>
+            </a:r>
+            <a:r>
+              <a:rPr lang="en-US" sz="1200" i="1" kern="1200" dirty="0" smtClean="0">
+                <a:solidFill>
+                  <a:schemeClr val="tx1"/>
+                </a:solidFill>
+                <a:effectLst/>
+                <a:latin typeface="+mn-lt"/>
+                <a:ea typeface="+mn-ea"/>
+                <a:cs typeface="+mn-cs"/>
+              </a:rPr>
+              <a:t>STEM) Academic Degrees</a:t>
             </a:r>
             <a:r>
               <a:rPr lang="en-US" sz="1200" kern="1200" dirty="0" smtClean="0">
@@ -4589,31 +4142,7 @@
                 <a:ea typeface="+mn-ea"/>
                 <a:cs typeface="+mn-cs"/>
               </a:rPr>
-              <a:t> </a:t>
-            </a:r>
-            <a:r>
-              <a:rPr lang="en-US" sz="1200" kern="1200" dirty="0" smtClean="0">
-                <a:solidFill>
-                  <a:schemeClr val="tx1"/>
-                </a:solidFill>
-                <a:effectLst/>
-                <a:latin typeface="+mn-lt"/>
-                <a:ea typeface="+mn-ea"/>
-                <a:cs typeface="+mn-cs"/>
-              </a:rPr>
-              <a:t>logical, systematic, critical and analytical thinking, and problem solving </a:t>
-            </a:r>
-            <a:r>
-              <a:rPr lang="en-US" sz="1200" kern="1200" dirty="0" smtClean="0">
-                <a:solidFill>
-                  <a:schemeClr val="tx1"/>
-                </a:solidFill>
-                <a:effectLst/>
-                <a:latin typeface="+mn-lt"/>
-                <a:ea typeface="+mn-ea"/>
-                <a:cs typeface="+mn-cs"/>
-              </a:rPr>
-              <a:t>skills.</a:t>
+              <a:t> logical, systematic, critical and analytical thinking, and problem solving skills.</a:t>
             </a:r>
             <a:r>
               <a:rPr lang="en-US" sz="1200" kern="1200" baseline="0" dirty="0" smtClean="0">
@@ -4637,19 +4166,7 @@
                 <a:ea typeface="+mn-ea"/>
                 <a:cs typeface="+mn-cs"/>
               </a:rPr>
-              <a:t> </a:t>
-            </a:r>
-            <a:r>
-              <a:rPr lang="en-US" sz="1200" kern="1200" dirty="0" smtClean="0">
-                <a:solidFill>
-                  <a:schemeClr val="tx1"/>
-                </a:solidFill>
-                <a:effectLst/>
-                <a:latin typeface="+mn-lt"/>
-                <a:ea typeface="+mn-ea"/>
-                <a:cs typeface="+mn-cs"/>
-              </a:rPr>
-              <a:t>are essential to perform the duties in non-STEM required career fields.</a:t>
+              <a:t> are essential to perform the duties in non-STEM required career fields.</a:t>
             </a:r>
             <a:r>
               <a:rPr lang="en-US" sz="1200" kern="1200" baseline="30000" dirty="0" smtClean="0">
@@ -4838,7 +4355,7 @@
                 <a:ea typeface="+mn-ea"/>
                 <a:cs typeface="+mn-cs"/>
               </a:rPr>
-              <a:t>he </a:t>
+              <a:t>he Air Force heavily relies upon the modern technologies to </a:t>
             </a:r>
             <a:r>
               <a:rPr lang="en-US" sz="1200" kern="1200" dirty="0" smtClean="0">
@@ -4850,7 +4367,43 @@
                 <a:ea typeface="+mn-ea"/>
                 <a:cs typeface="+mn-cs"/>
               </a:rPr>
-              <a:t>Air Force heavily relies upon the modern technologies to possess compelling air, space and cyberspace capabilities. The growing complexity of both traditional and future missions will likely increase STEM degree needs.</a:t>
+              <a:t>fight and win in </a:t>
+            </a:r>
+            <a:r>
+              <a:rPr lang="en-US" sz="1200" kern="1200" dirty="0" smtClean="0">
+                <a:solidFill>
+                  <a:schemeClr val="tx1"/>
+                </a:solidFill>
+                <a:effectLst/>
+                <a:latin typeface="+mn-lt"/>
+                <a:ea typeface="+mn-ea"/>
+                <a:cs typeface="+mn-cs"/>
+              </a:rPr>
+              <a:t>air, space and </a:t>
+            </a:r>
+            <a:r>
+              <a:rPr lang="en-US" sz="1200" kern="1200" dirty="0" smtClean="0">
+                <a:solidFill>
+                  <a:schemeClr val="tx1"/>
+                </a:solidFill>
+                <a:effectLst/>
+                <a:latin typeface="+mn-lt"/>
+                <a:ea typeface="+mn-ea"/>
+                <a:cs typeface="+mn-cs"/>
+              </a:rPr>
+              <a:t>cyberspace. </a:t>
+            </a:r>
+            <a:r>
+              <a:rPr lang="en-US" sz="1200" kern="1200" dirty="0" smtClean="0">
+                <a:solidFill>
+                  <a:schemeClr val="tx1"/>
+                </a:solidFill>
+                <a:effectLst/>
+                <a:latin typeface="+mn-lt"/>
+                <a:ea typeface="+mn-ea"/>
+                <a:cs typeface="+mn-cs"/>
+              </a:rPr>
+              <a:t>The growing complexity of both traditional and future missions will likely increase STEM degree needs.</a:t>
             </a:r>
             <a:r>
               <a:rPr lang="en-US" sz="1200" kern="1200" baseline="30000" dirty="0" smtClean="0">
@@ -4898,7 +4451,115 @@
                 <a:ea typeface="+mn-ea"/>
                 <a:cs typeface="+mn-cs"/>
               </a:rPr>
-              <a:t> It is predicted that while over 5,100 the Air Force officers with STEM degrees currently serve in some non-STEM required areas, some 3,200 more officers with STEM degrees are required to meet current needs.</a:t>
+              <a:t> </a:t>
+            </a:r>
+            <a:r>
+              <a:rPr lang="en-US" sz="1200" kern="1200" dirty="0" smtClean="0">
+                <a:solidFill>
+                  <a:schemeClr val="tx1"/>
+                </a:solidFill>
+                <a:effectLst/>
+                <a:latin typeface="+mn-lt"/>
+                <a:ea typeface="+mn-ea"/>
+                <a:cs typeface="+mn-cs"/>
+              </a:rPr>
+              <a:t> The bar chart shows that while </a:t>
+            </a:r>
+            <a:r>
+              <a:rPr lang="en-US" sz="1200" kern="1200" dirty="0" smtClean="0">
+                <a:solidFill>
+                  <a:schemeClr val="tx1"/>
+                </a:solidFill>
+                <a:effectLst/>
+                <a:latin typeface="+mn-lt"/>
+                <a:ea typeface="+mn-ea"/>
+                <a:cs typeface="+mn-cs"/>
+              </a:rPr>
+              <a:t>over 5,100 the Air Force officers with STEM degrees currently serve in some non-STEM required </a:t>
+            </a:r>
+            <a:r>
+              <a:rPr lang="en-US" sz="1200" kern="1200" dirty="0" smtClean="0">
+                <a:solidFill>
+                  <a:schemeClr val="tx1"/>
+                </a:solidFill>
+                <a:effectLst/>
+                <a:latin typeface="+mn-lt"/>
+                <a:ea typeface="+mn-ea"/>
+                <a:cs typeface="+mn-cs"/>
+              </a:rPr>
+              <a:t>areas as shown in blue, 3,200 </a:t>
+            </a:r>
+            <a:r>
+              <a:rPr lang="en-US" sz="1200" kern="1200" dirty="0" smtClean="0">
+                <a:solidFill>
+                  <a:schemeClr val="tx1"/>
+                </a:solidFill>
+                <a:effectLst/>
+                <a:latin typeface="+mn-lt"/>
+                <a:ea typeface="+mn-ea"/>
+                <a:cs typeface="+mn-cs"/>
+              </a:rPr>
+              <a:t>more officers with STEM degrees are </a:t>
+            </a:r>
+            <a:r>
+              <a:rPr lang="en-US" sz="1200" kern="1200" dirty="0" smtClean="0">
+                <a:solidFill>
+                  <a:schemeClr val="tx1"/>
+                </a:solidFill>
+                <a:effectLst/>
+                <a:latin typeface="+mn-lt"/>
+                <a:ea typeface="+mn-ea"/>
+                <a:cs typeface="+mn-cs"/>
+              </a:rPr>
+              <a:t>desired</a:t>
+            </a:r>
+            <a:r>
+              <a:rPr lang="en-US" sz="1200" kern="1200" baseline="0" dirty="0" smtClean="0">
+                <a:solidFill>
+                  <a:schemeClr val="tx1"/>
+                </a:solidFill>
+                <a:effectLst/>
+                <a:latin typeface="+mn-lt"/>
+                <a:ea typeface="+mn-ea"/>
+                <a:cs typeface="+mn-cs"/>
+              </a:rPr>
+              <a:t> </a:t>
+            </a:r>
+            <a:r>
+              <a:rPr lang="en-US" sz="1200" kern="1200" dirty="0" smtClean="0">
+                <a:solidFill>
+                  <a:schemeClr val="tx1"/>
+                </a:solidFill>
+                <a:effectLst/>
+                <a:latin typeface="+mn-lt"/>
+                <a:ea typeface="+mn-ea"/>
+                <a:cs typeface="+mn-cs"/>
+              </a:rPr>
+              <a:t>to </a:t>
+            </a:r>
+            <a:r>
+              <a:rPr lang="en-US" sz="1200" kern="1200" dirty="0" smtClean="0">
+                <a:solidFill>
+                  <a:schemeClr val="tx1"/>
+                </a:solidFill>
+                <a:effectLst/>
+                <a:latin typeface="+mn-lt"/>
+                <a:ea typeface="+mn-ea"/>
+                <a:cs typeface="+mn-cs"/>
+              </a:rPr>
+              <a:t>meet current </a:t>
+            </a:r>
+            <a:r>
+              <a:rPr lang="en-US" sz="1200" kern="1200" dirty="0" smtClean="0">
+                <a:solidFill>
+                  <a:schemeClr val="tx1"/>
+                </a:solidFill>
+                <a:effectLst/>
+                <a:latin typeface="+mn-lt"/>
+                <a:ea typeface="+mn-ea"/>
+                <a:cs typeface="+mn-cs"/>
+              </a:rPr>
+              <a:t>needs as shown in red.</a:t>
             </a:r>
             <a:r>
               <a:rPr lang="en-US" sz="1200" kern="1200" baseline="30000" dirty="0" smtClean="0">
@@ -10628,11 +10289,7 @@
           <a:p>
             <a:r>
               <a:rPr lang="en-US" sz="2800" dirty="0" smtClean="0"/>
-              <a:t>Wei Cui, </a:t>
-            </a:r>
-            <a:r>
-              <a:rPr lang="en-US" sz="2800" dirty="0" smtClean="0"/>
-              <a:t>Cadet </a:t>
+              <a:t>Wei Cui, Cadet </a:t>
             </a:r>
             <a:r>
               <a:rPr lang="en-US" sz="2800" dirty="0" err="1" smtClean="0"/>
@@ -10640,11 +10297,7 @@
             </a:r>
             <a:r>
               <a:rPr lang="en-US" sz="2800" dirty="0" smtClean="0"/>
-              <a:t>, </a:t>
-            </a:r>
-            <a:r>
-              <a:rPr lang="en-US" sz="2800" dirty="0" smtClean="0"/>
-              <a:t>USAF</a:t>
+              <a:t>, USAF</a:t>
             </a:r>
             <a:endParaRPr lang="en-US" sz="2800" dirty="0"/>
           </a:p>
@@ -11022,7 +10675,45 @@
             </a:r>
             <a:r>
               <a:rPr lang="en-US" sz="2800" i="1" dirty="0" smtClean="0"/>
-              <a:t>comptrollers.</a:t>
+              <a:t>comptrollers</a:t>
+            </a:r>
+            <a:r>
+              <a:rPr lang="en-US" sz="2800" i="1" dirty="0" smtClean="0"/>
+              <a:t>.</a:t>
+            </a:r>
+          </a:p>
+          <a:p>
+            <a:pPr marL="0" indent="0" eaLnBrk="1" hangingPunct="1">
+              <a:lnSpc>
+                <a:spcPct val="125000"/>
+              </a:lnSpc>
+              <a:buSzPct val="75000"/>
+              <a:buNone/>
+            </a:pPr>
+            <a:r>
+              <a:rPr lang="en-US" sz="2800" i="1" dirty="0"/>
+              <a:t>	</a:t>
+            </a:r>
+            <a:r>
+              <a:rPr lang="en-US" sz="2800" i="1" dirty="0" smtClean="0"/>
+              <a:t>				</a:t>
+            </a:r>
+          </a:p>
+          <a:p>
+            <a:pPr marL="0" indent="0" eaLnBrk="1" hangingPunct="1">
+              <a:lnSpc>
+                <a:spcPct val="125000"/>
+              </a:lnSpc>
+              <a:buSzPct val="75000"/>
+              <a:buNone/>
+            </a:pPr>
+            <a:r>
+              <a:rPr lang="en-US" sz="2800" i="1" dirty="0"/>
+              <a:t>	</a:t>
+            </a:r>
+            <a:r>
+              <a:rPr lang="en-US" sz="2800" i="1" dirty="0" smtClean="0"/>
+              <a:t>			  Lt Col Gary T. McCoy</a:t>
             </a:r>
             <a:r>
               <a:rPr lang="en-US" sz="2800" dirty="0" smtClean="0"/>
@@ -11032,7 +10723,27 @@
               <a:rPr lang="en-US" sz="2800" baseline="30000" dirty="0" smtClean="0"/>
               <a:t>8</a:t>
             </a:r>
+          </a:p>
+          <a:p>
+            <a:pPr marL="465138" indent="-465138" eaLnBrk="1" hangingPunct="1">
+              <a:lnSpc>
+                <a:spcPct val="125000"/>
+              </a:lnSpc>
+              <a:buSzPct val="75000"/>
+              <a:buFont typeface="Wingdings" pitchFamily="2" charset="2"/>
+              <a:buChar char="v"/>
+            </a:pPr>
             <a:endParaRPr lang="en-US" sz="2800" baseline="30000" dirty="0"/>
+          </a:p>
+          <a:p>
+            <a:pPr marL="2171700" lvl="5" indent="0">
+              <a:lnSpc>
+                <a:spcPct val="125000"/>
+              </a:lnSpc>
+              <a:buSzPct val="75000"/>
+              <a:buNone/>
+            </a:pPr>
+            <a:endParaRPr lang="en-US" sz="1600" dirty="0"/>
           </a:p>
           <a:p>
             <a:pPr marL="465138" indent="-465138" eaLnBrk="1" hangingPunct="1">
@@ -11572,21 +11283,7 @@
                 <a:latin typeface="Times New Roman" panose="02020603050405020304" pitchFamily="18" charset="0"/>
                 <a:cs typeface="Times New Roman" panose="02020603050405020304" pitchFamily="18" charset="0"/>
               </a:rPr>
-              <a:t>Figure </a:t>
-            </a:r>
-            <a:r>
-              <a:rPr lang="en-US" dirty="0" smtClean="0">
-                <a:latin typeface="Times New Roman" panose="02020603050405020304" pitchFamily="18" charset="0"/>
-                <a:cs typeface="Times New Roman" panose="02020603050405020304" pitchFamily="18" charset="0"/>
-              </a:rPr>
-              <a:t>3. Recent four Chief of Staffs of the Air Force. </a:t>
-            </a:r>
-            <a:r>
-              <a:rPr lang="en-US" dirty="0" smtClean="0">
-                <a:latin typeface="Times New Roman" panose="02020603050405020304" pitchFamily="18" charset="0"/>
-                <a:cs typeface="Times New Roman" panose="02020603050405020304" pitchFamily="18" charset="0"/>
-              </a:rPr>
-              <a:t>Left </a:t>
+              <a:t>Figure 3. Recent four Chief of Staffs of the Air Force. Left </a:t>
             </a:r>
             <a:r>
               <a:rPr lang="en-US" dirty="0">
@@ -11725,17 +11422,6 @@
               </a:rPr>
               <a:t>Eligibility</a:t>
             </a:r>
-            <a:endParaRPr lang="en-US" b="1" dirty="0" smtClean="0">
-              <a:effectLst>
-                <a:outerShdw blurRad="38100" dist="38100" dir="2700000" algn="tl">
-                  <a:srgbClr val="000000">
-                    <a:alpha val="43137"/>
-                  </a:srgbClr>
-                </a:outerShdw>
-              </a:effectLst>
-              <a:latin typeface="Times New Roman" panose="02020603050405020304" pitchFamily="18" charset="0"/>
-              <a:cs typeface="Times New Roman" panose="02020603050405020304" pitchFamily="18" charset="0"/>
-            </a:endParaRPr>
           </a:p>
           <a:p>
             <a:pPr marL="465138" indent="-465138" eaLnBrk="1" hangingPunct="1">
@@ -12027,11 +11713,7 @@
             </a:pPr>
             <a:r>
               <a:rPr lang="en-US" sz="2000" dirty="0" smtClean="0"/>
-              <a:t>1.  </a:t>
-            </a:r>
-            <a:r>
-              <a:rPr lang="en-US" sz="2000" dirty="0" smtClean="0"/>
-              <a:t>US Immigration and Customs Enforcement, </a:t>
+              <a:t>1.  US Immigration and Customs Enforcement, </a:t>
             </a:r>
             <a:r>
               <a:rPr lang="en-US" sz="2000" i="1" dirty="0"/>
@@ -12045,7 +11727,6 @@
               <a:rPr lang="en-US" sz="2000" dirty="0" smtClean="0"/>
               <a:t>. </a:t>
             </a:r>
-            <a:endParaRPr lang="en-US" sz="2000" dirty="0" smtClean="0"/>
           </a:p>
           <a:p>
             <a:pPr marL="0" indent="0" eaLnBrk="1" hangingPunct="1">
@@ -12125,11 +11806,7 @@
             </a:pPr>
             <a:r>
               <a:rPr lang="en-US" sz="2000" dirty="0" smtClean="0"/>
-              <a:t>5.  </a:t>
-            </a:r>
-            <a:r>
-              <a:rPr lang="en-US" sz="2000" dirty="0" smtClean="0"/>
-              <a:t>Lisa </a:t>
+              <a:t>5.  Lisa </a:t>
             </a:r>
             <a:r>
               <a:rPr lang="en-US" sz="2000" dirty="0"/>
@@ -12155,11 +11832,7 @@
             </a:pPr>
             <a:r>
               <a:rPr lang="en-US" sz="2000" dirty="0" smtClean="0"/>
-              <a:t>6.  </a:t>
-            </a:r>
-            <a:r>
-              <a:rPr lang="en-US" sz="2000" dirty="0" smtClean="0"/>
-              <a:t>Ibid</a:t>
+              <a:t>6.  Ibid</a:t>
             </a:r>
             <a:r>
               <a:rPr lang="en-US" sz="2000" dirty="0"/>
@@ -12372,14 +12045,10 @@
             </a:r>
             <a:r>
               <a:rPr lang="en-US" sz="2000" dirty="0"/>
-              <a:t> (Maxwell AFB, AL: Air University, April 1996</a:t>
-            </a:r>
-            <a:r>
-              <a:rPr lang="en-US" sz="2000"/>
-              <a:t>), </a:t>
-            </a:r>
-            <a:r>
-              <a:rPr lang="en-US" sz="2000" smtClean="0"/>
+              <a:t> (Maxwell AFB, AL: Air University, April 1996), </a:t>
+            </a:r>
+            <a:r>
+              <a:rPr lang="en-US" sz="2000" dirty="0" smtClean="0"/>
               <a:t>4.</a:t>
             </a:r>
             <a:endParaRPr lang="en-US" sz="2000" dirty="0"/>
@@ -12390,11 +12059,7 @@
             </a:pPr>
             <a:r>
               <a:rPr lang="en-US" sz="2000" dirty="0" smtClean="0"/>
-              <a:t>9.  </a:t>
-            </a:r>
-            <a:r>
-              <a:rPr lang="en-US" sz="2000" dirty="0" smtClean="0"/>
-              <a:t>General </a:t>
+              <a:t>9.  General </a:t>
             </a:r>
             <a:r>
               <a:rPr lang="en-US" sz="2000" dirty="0"/>
@@ -12694,17 +12359,6 @@
               </a:rPr>
               <a:t>Eligibility</a:t>
             </a:r>
-            <a:endParaRPr lang="en-US" b="1" dirty="0" smtClean="0">
-              <a:effectLst>
-                <a:outerShdw blurRad="38100" dist="38100" dir="2700000" algn="tl">
-                  <a:srgbClr val="000000">
-                    <a:alpha val="43137"/>
-                  </a:srgbClr>
-                </a:outerShdw>
-              </a:effectLst>
-              <a:latin typeface="Times New Roman" panose="02020603050405020304" pitchFamily="18" charset="0"/>
-              <a:cs typeface="Times New Roman" panose="02020603050405020304" pitchFamily="18" charset="0"/>
-            </a:endParaRPr>
           </a:p>
           <a:p>
             <a:pPr marL="465138" indent="-465138" eaLnBrk="1" hangingPunct="1">
@@ -13428,23 +13082,7 @@
             </a:pPr>
             <a:r>
               <a:rPr lang="en-US" sz="2800" dirty="0" smtClean="0"/>
-              <a:t>There </a:t>
-            </a:r>
-            <a:r>
-              <a:rPr lang="en-US" sz="2800" dirty="0" smtClean="0"/>
-              <a:t>are </a:t>
-            </a:r>
-            <a:r>
-              <a:rPr lang="en-US" sz="2800" dirty="0" smtClean="0"/>
-              <a:t>only five </a:t>
-            </a:r>
-            <a:r>
-              <a:rPr lang="en-US" sz="2800" dirty="0" smtClean="0"/>
-              <a:t>out of 26 Air Force Specialty Codes (</a:t>
-            </a:r>
-            <a:r>
-              <a:rPr lang="en-US" sz="2800" dirty="0" smtClean="0"/>
-              <a:t>AFSC</a:t>
+              <a:t>There are only five out of 26 Air Force Specialty Codes (AFSC</a:t>
             </a:r>
             <a:r>
               <a:rPr lang="en-US" altLang="zh-CN" sz="2800" dirty="0" smtClean="0"/>
@@ -13452,15 +13090,7 @@
             </a:r>
             <a:r>
               <a:rPr lang="en-US" sz="2800" dirty="0" smtClean="0"/>
-              <a:t>) </a:t>
-            </a:r>
-            <a:r>
-              <a:rPr lang="en-US" sz="2800" dirty="0" smtClean="0"/>
-              <a:t>require a STEM </a:t>
-            </a:r>
-            <a:r>
-              <a:rPr lang="en-US" sz="2800" dirty="0" smtClean="0"/>
-              <a:t>degree.</a:t>
+              <a:t>) require a STEM degree.</a:t>
             </a:r>
             <a:r>
               <a:rPr lang="en-US" sz="2800" baseline="30000" dirty="0" smtClean="0"/>
@@ -14044,27 +13674,7 @@
             </a:pPr>
             <a:r>
               <a:rPr lang="en-US" sz="2800" dirty="0" smtClean="0"/>
-              <a:t>Some </a:t>
-            </a:r>
-            <a:r>
-              <a:rPr lang="en-US" sz="2800" dirty="0" smtClean="0"/>
-              <a:t>career </a:t>
-            </a:r>
-            <a:r>
-              <a:rPr lang="en-US" sz="2800" dirty="0" smtClean="0"/>
-              <a:t>fields </a:t>
-            </a:r>
-            <a:r>
-              <a:rPr lang="en-US" sz="2800" dirty="0" smtClean="0"/>
-              <a:t>require a license or </a:t>
-            </a:r>
-            <a:r>
-              <a:rPr lang="en-US" sz="2800" dirty="0" smtClean="0"/>
-              <a:t>experience </a:t>
-            </a:r>
-            <a:r>
-              <a:rPr lang="en-US" sz="2800" dirty="0" smtClean="0"/>
-              <a:t>in the nursing or chaplaincy fields.</a:t>
+              <a:t>Some career fields require a license or experience in the nursing or chaplaincy fields.</a:t>
             </a:r>
             <a:r>
               <a:rPr lang="en-US" sz="2800" baseline="30000" dirty="0" smtClean="0"/>
@@ -14074,7 +13684,6 @@
               <a:rPr lang="en-US" sz="2800" dirty="0" smtClean="0"/>
               <a:t> </a:t>
             </a:r>
-            <a:endParaRPr lang="en-US" sz="2800" dirty="0" smtClean="0"/>
           </a:p>
           <a:p>
             <a:pPr marL="465138" indent="-465138" eaLnBrk="1" hangingPunct="1">
@@ -14814,11 +14423,7 @@
             </a:r>
             <a:r>
               <a:rPr lang="en-US" sz="2800" dirty="0" smtClean="0"/>
-              <a:t>the non-STEM required career </a:t>
-            </a:r>
-            <a:r>
-              <a:rPr lang="en-US" sz="2800" dirty="0" smtClean="0"/>
-              <a:t>fields.</a:t>
+              <a:t>the non-STEM required career fields.</a:t>
             </a:r>
             <a:r>
               <a:rPr lang="en-US" sz="2800" baseline="30000" dirty="0" smtClean="0"/>
@@ -14852,17 +14457,12 @@
             </a:r>
             <a:r>
               <a:rPr lang="en-US" sz="2800" dirty="0" smtClean="0"/>
-              <a:t>have some skills such as analytical thinking and problem solving are essential to perform duties in non-STEM required career </a:t>
-            </a:r>
-            <a:r>
-              <a:rPr lang="en-US" sz="2800" dirty="0" smtClean="0"/>
-              <a:t>fields.</a:t>
+              <a:t>have some skills such as analytical thinking and problem solving are essential to perform duties in non-STEM required career fields.</a:t>
             </a:r>
             <a:r>
               <a:rPr lang="en-US" sz="2800" baseline="30000" dirty="0" smtClean="0"/>
               <a:t>6</a:t>
             </a:r>
-            <a:endParaRPr lang="en-US" sz="2800" baseline="30000" dirty="0" smtClean="0"/>
           </a:p>
           <a:p>
             <a:pPr marL="465138" indent="-465138" eaLnBrk="1" hangingPunct="1">
@@ -15332,7 +14932,6 @@
               <a:rPr lang="en-US" sz="2800" baseline="30000" dirty="0" smtClean="0"/>
               <a:t>7</a:t>
             </a:r>
-            <a:endParaRPr lang="en-US" sz="2800" baseline="30000" dirty="0" smtClean="0"/>
           </a:p>
           <a:p>
             <a:pPr marL="465138" indent="-465138" eaLnBrk="1" hangingPunct="1">
@@ -15429,49 +15028,7 @@
                 <a:latin typeface="Times New Roman" panose="02020603050405020304" pitchFamily="18" charset="0"/>
                 <a:cs typeface="Times New Roman" panose="02020603050405020304" pitchFamily="18" charset="0"/>
               </a:rPr>
-              <a:t>Summary of Desired Officer STEM Population in Non-STEM Functional </a:t>
-            </a:r>
-            <a:r>
-              <a:rPr lang="en-US" dirty="0">
-                <a:latin typeface="Times New Roman" panose="02020603050405020304" pitchFamily="18" charset="0"/>
-                <a:cs typeface="Times New Roman" panose="02020603050405020304" pitchFamily="18" charset="0"/>
-              </a:rPr>
-              <a:t>Areas. </a:t>
-            </a:r>
-            <a:r>
-              <a:rPr lang="en-US" dirty="0">
-                <a:latin typeface="Times New Roman" panose="02020603050405020304" pitchFamily="18" charset="0"/>
-                <a:cs typeface="Times New Roman" panose="02020603050405020304" pitchFamily="18" charset="0"/>
-              </a:rPr>
-              <a:t>C</a:t>
-            </a:r>
-            <a:r>
-              <a:rPr lang="en-US" dirty="0">
-                <a:latin typeface="Times New Roman" panose="02020603050405020304" pitchFamily="18" charset="0"/>
-                <a:cs typeface="Times New Roman" panose="02020603050405020304" pitchFamily="18" charset="0"/>
-              </a:rPr>
-              <a:t>ourtesy </a:t>
-            </a:r>
-            <a:r>
-              <a:rPr lang="en-US" dirty="0">
-                <a:latin typeface="Times New Roman" panose="02020603050405020304" pitchFamily="18" charset="0"/>
-                <a:cs typeface="Times New Roman" panose="02020603050405020304" pitchFamily="18" charset="0"/>
-              </a:rPr>
-              <a:t>of </a:t>
-            </a:r>
-            <a:r>
-              <a:rPr lang="en-US" dirty="0">
-                <a:latin typeface="Times New Roman" panose="02020603050405020304" pitchFamily="18" charset="0"/>
-                <a:cs typeface="Times New Roman" panose="02020603050405020304" pitchFamily="18" charset="0"/>
-              </a:rPr>
-              <a:t>Air </a:t>
-            </a:r>
-            <a:r>
-              <a:rPr lang="en-US" dirty="0">
-                <a:latin typeface="Times New Roman" panose="02020603050405020304" pitchFamily="18" charset="0"/>
-                <a:cs typeface="Times New Roman" panose="02020603050405020304" pitchFamily="18" charset="0"/>
-              </a:rPr>
-              <a:t>Force Studies Board, </a:t>
+              <a:t>Summary of Desired Officer STEM Population in Non-STEM Functional Areas. Courtesy of Air Force Studies Board, </a:t>
             </a:r>
             <a:r>
               <a:rPr lang="en-US" i="1" dirty="0" smtClean="0">
@@ -15492,19 +15049,8 @@
                 <a:latin typeface="Times New Roman" panose="02020603050405020304" pitchFamily="18" charset="0"/>
                 <a:cs typeface="Times New Roman" panose="02020603050405020304" pitchFamily="18" charset="0"/>
               </a:rPr>
-              <a:t>National Academies Press, 2010), </a:t>
-            </a:r>
-            <a:r>
-              <a:rPr lang="en-US" dirty="0">
-                <a:latin typeface="Times New Roman" panose="02020603050405020304" pitchFamily="18" charset="0"/>
-                <a:cs typeface="Times New Roman" panose="02020603050405020304" pitchFamily="18" charset="0"/>
-              </a:rPr>
-              <a:t>31.</a:t>
-            </a:r>
-            <a:endParaRPr lang="en-US" dirty="0">
-              <a:latin typeface="Times New Roman" panose="02020603050405020304" pitchFamily="18" charset="0"/>
-              <a:cs typeface="Times New Roman" panose="02020603050405020304" pitchFamily="18" charset="0"/>
-            </a:endParaRPr>
+              <a:t>National Academies Press, 2010), 31.</a:t>
+            </a:r>
           </a:p>
         </p:txBody>
       </p:sp>

</xml_diff>